<commit_message>
add a presententation on EBM and bon ds
</commit_message>
<xml_diff>
--- a/mylearnings/mylecturenotes/GlassBox_ML_and_CorporateBondReturns.pptx
+++ b/mylearnings/mylecturenotes/GlassBox_ML_and_CorporateBondReturns.pptx
@@ -5,7 +5,7 @@
     <p:sldMasterId id="2147483648" r:id="rId1"/>
   </p:sldMasterIdLst>
   <p:notesMasterIdLst>
-    <p:notesMasterId r:id="rId28"/>
+    <p:notesMasterId r:id="rId29"/>
   </p:notesMasterIdLst>
   <p:sldIdLst>
     <p:sldId id="256" r:id="rId2"/>
@@ -22,18 +22,19 @@
     <p:sldId id="265" r:id="rId13"/>
     <p:sldId id="266" r:id="rId14"/>
     <p:sldId id="268" r:id="rId15"/>
-    <p:sldId id="269" r:id="rId16"/>
-    <p:sldId id="270" r:id="rId17"/>
-    <p:sldId id="276" r:id="rId18"/>
-    <p:sldId id="277" r:id="rId19"/>
-    <p:sldId id="271" r:id="rId20"/>
-    <p:sldId id="272" r:id="rId21"/>
-    <p:sldId id="273" r:id="rId22"/>
-    <p:sldId id="274" r:id="rId23"/>
-    <p:sldId id="275" r:id="rId24"/>
-    <p:sldId id="280" r:id="rId25"/>
-    <p:sldId id="281" r:id="rId26"/>
-    <p:sldId id="278" r:id="rId27"/>
+    <p:sldId id="283" r:id="rId16"/>
+    <p:sldId id="269" r:id="rId17"/>
+    <p:sldId id="270" r:id="rId18"/>
+    <p:sldId id="276" r:id="rId19"/>
+    <p:sldId id="277" r:id="rId20"/>
+    <p:sldId id="271" r:id="rId21"/>
+    <p:sldId id="272" r:id="rId22"/>
+    <p:sldId id="273" r:id="rId23"/>
+    <p:sldId id="274" r:id="rId24"/>
+    <p:sldId id="275" r:id="rId25"/>
+    <p:sldId id="280" r:id="rId26"/>
+    <p:sldId id="281" r:id="rId27"/>
+    <p:sldId id="278" r:id="rId28"/>
   </p:sldIdLst>
   <p:sldSz cx="12192000" cy="6858000"/>
   <p:notesSz cx="6858000" cy="9144000"/>
@@ -717,7 +718,91 @@
           <a:p>
             <a:fld id="{93477369-5FB8-BA47-AC51-3FC5A2167640}" type="slidenum">
               <a:rPr lang="en-US" smtClean="0"/>
-              <a:t>22</a:t>
+              <a:t>15</a:t>
+            </a:fld>
+            <a:endParaRPr lang="en-US"/>
+          </a:p>
+        </p:txBody>
+      </p:sp>
+    </p:spTree>
+    <p:extLst>
+      <p:ext uri="{BB962C8B-B14F-4D97-AF65-F5344CB8AC3E}">
+        <p14:creationId xmlns:p14="http://schemas.microsoft.com/office/powerpoint/2010/main" val="1123184156"/>
+      </p:ext>
+    </p:extLst>
+  </p:cSld>
+  <p:clrMapOvr>
+    <a:masterClrMapping/>
+  </p:clrMapOvr>
+</p:notes>
+</file>
+
+<file path=ppt/notesSlides/notesSlide4.xml><?xml version="1.0" encoding="utf-8"?>
+<p:notes xmlns:a="http://schemas.openxmlformats.org/drawingml/2006/main" xmlns:r="http://schemas.openxmlformats.org/officeDocument/2006/relationships" xmlns:p="http://schemas.openxmlformats.org/presentationml/2006/main">
+  <p:cSld>
+    <p:spTree>
+      <p:nvGrpSpPr>
+        <p:cNvPr id="1" name=""/>
+        <p:cNvGrpSpPr/>
+        <p:nvPr/>
+      </p:nvGrpSpPr>
+      <p:grpSpPr>
+        <a:xfrm>
+          <a:off x="0" y="0"/>
+          <a:ext cx="0" cy="0"/>
+          <a:chOff x="0" y="0"/>
+          <a:chExt cx="0" cy="0"/>
+        </a:xfrm>
+      </p:grpSpPr>
+      <p:sp>
+        <p:nvSpPr>
+          <p:cNvPr id="2" name="Slide Image Placeholder 1"/>
+          <p:cNvSpPr>
+            <a:spLocks noGrp="1" noRot="1" noChangeAspect="1"/>
+          </p:cNvSpPr>
+          <p:nvPr>
+            <p:ph type="sldImg"/>
+          </p:nvPr>
+        </p:nvSpPr>
+        <p:spPr/>
+      </p:sp>
+      <p:sp>
+        <p:nvSpPr>
+          <p:cNvPr id="3" name="Notes Placeholder 2"/>
+          <p:cNvSpPr>
+            <a:spLocks noGrp="1"/>
+          </p:cNvSpPr>
+          <p:nvPr>
+            <p:ph type="body" idx="1"/>
+          </p:nvPr>
+        </p:nvSpPr>
+        <p:spPr/>
+        <p:txBody>
+          <a:bodyPr/>
+          <a:lstStyle/>
+          <a:p>
+            <a:endParaRPr lang="en-US" dirty="0"/>
+          </a:p>
+        </p:txBody>
+      </p:sp>
+      <p:sp>
+        <p:nvSpPr>
+          <p:cNvPr id="4" name="Slide Number Placeholder 3"/>
+          <p:cNvSpPr>
+            <a:spLocks noGrp="1"/>
+          </p:cNvSpPr>
+          <p:nvPr>
+            <p:ph type="sldNum" sz="quarter" idx="5"/>
+          </p:nvPr>
+        </p:nvSpPr>
+        <p:spPr/>
+        <p:txBody>
+          <a:bodyPr/>
+          <a:lstStyle/>
+          <a:p>
+            <a:fld id="{93477369-5FB8-BA47-AC51-3FC5A2167640}" type="slidenum">
+              <a:rPr lang="en-US" smtClean="0"/>
+              <a:t>23</a:t>
             </a:fld>
             <a:endParaRPr lang="en-US"/>
           </a:p>
@@ -4921,6 +5006,243 @@
           <p:cNvPr id="2" name="Title 1">
             <a:extLst>
               <a:ext uri="{FF2B5EF4-FFF2-40B4-BE49-F238E27FC236}">
+                <a16:creationId xmlns:a16="http://schemas.microsoft.com/office/drawing/2014/main" id="{7C07B14D-FD43-AD4D-7D9C-FFC4CDC2C8E2}"/>
+              </a:ext>
+            </a:extLst>
+          </p:cNvPr>
+          <p:cNvSpPr>
+            <a:spLocks noGrp="1"/>
+          </p:cNvSpPr>
+          <p:nvPr>
+            <p:ph type="title"/>
+          </p:nvPr>
+        </p:nvSpPr>
+        <p:spPr>
+          <a:xfrm>
+            <a:off x="0" y="0"/>
+            <a:ext cx="10515600" cy="706930"/>
+          </a:xfrm>
+        </p:spPr>
+        <p:txBody>
+          <a:bodyPr/>
+          <a:lstStyle/>
+          <a:p>
+            <a:r>
+              <a:rPr lang="en-US" dirty="0"/>
+              <a:t>Methodology of excess return calculation</a:t>
+            </a:r>
+          </a:p>
+        </p:txBody>
+      </p:sp>
+      <p:sp>
+        <p:nvSpPr>
+          <p:cNvPr id="3" name="Content Placeholder 2">
+            <a:extLst>
+              <a:ext uri="{FF2B5EF4-FFF2-40B4-BE49-F238E27FC236}">
+                <a16:creationId xmlns:a16="http://schemas.microsoft.com/office/drawing/2014/main" id="{615F86AE-B4F6-77A4-2117-D9F92A3A6EDB}"/>
+              </a:ext>
+            </a:extLst>
+          </p:cNvPr>
+          <p:cNvSpPr>
+            <a:spLocks noGrp="1"/>
+          </p:cNvSpPr>
+          <p:nvPr>
+            <p:ph idx="1"/>
+          </p:nvPr>
+        </p:nvSpPr>
+        <p:spPr>
+          <a:xfrm>
+            <a:off x="1261241" y="6342665"/>
+            <a:ext cx="8516007" cy="365125"/>
+          </a:xfrm>
+        </p:spPr>
+        <p:txBody>
+          <a:bodyPr>
+            <a:normAutofit/>
+          </a:bodyPr>
+          <a:lstStyle/>
+          <a:p>
+            <a:pPr marL="0" indent="0">
+              <a:buNone/>
+            </a:pPr>
+            <a:r>
+              <a:rPr lang="en-US" sz="1200" dirty="0">
+                <a:effectLst/>
+                <a:latin typeface="LucidaBrightOT-Identity-H"/>
+              </a:rPr>
+              <a:t>Kelly, Bryan, Diogo </a:t>
+            </a:r>
+            <a:r>
+              <a:rPr lang="en-US" sz="1200" dirty="0" err="1">
+                <a:effectLst/>
+                <a:latin typeface="LucidaBrightOT-Identity-H"/>
+              </a:rPr>
+              <a:t>Palhares</a:t>
+            </a:r>
+            <a:r>
+              <a:rPr lang="en-US" sz="1200" dirty="0">
+                <a:effectLst/>
+                <a:latin typeface="LucidaBrightOT-Identity-H"/>
+              </a:rPr>
+              <a:t>, and Seth Pruitt (2023) “</a:t>
+            </a:r>
+            <a:r>
+              <a:rPr lang="en-US" sz="1200" dirty="0">
+                <a:effectLst/>
+                <a:latin typeface="LucidaBrightOT-Identity-H"/>
+                <a:hlinkClick r:id="rId3"/>
+              </a:rPr>
+              <a:t>Modeling corporate bond returns</a:t>
+            </a:r>
+            <a:r>
+              <a:rPr lang="en-US" sz="1200" dirty="0">
+                <a:effectLst/>
+                <a:latin typeface="LucidaBrightOT-Identity-H"/>
+              </a:rPr>
+              <a:t>,” </a:t>
+            </a:r>
+            <a:r>
+              <a:rPr lang="en-US" sz="1200" dirty="0">
+                <a:effectLst/>
+                <a:latin typeface="LucidaBrightOT-Italic-Identity-H"/>
+              </a:rPr>
+              <a:t>The Journal of  Finance</a:t>
+            </a:r>
+            <a:r>
+              <a:rPr lang="en-US" sz="1200" dirty="0">
+                <a:effectLst/>
+                <a:latin typeface="LucidaBrightOT-Identity-H"/>
+              </a:rPr>
+              <a:t>.</a:t>
+            </a:r>
+            <a:endParaRPr lang="en-US" sz="2400" dirty="0"/>
+          </a:p>
+        </p:txBody>
+      </p:sp>
+      <p:sp>
+        <p:nvSpPr>
+          <p:cNvPr id="4" name="Slide Number Placeholder 3">
+            <a:extLst>
+              <a:ext uri="{FF2B5EF4-FFF2-40B4-BE49-F238E27FC236}">
+                <a16:creationId xmlns:a16="http://schemas.microsoft.com/office/drawing/2014/main" id="{3DAD5A85-CBD5-C3C0-1FB6-0678384333ED}"/>
+              </a:ext>
+            </a:extLst>
+          </p:cNvPr>
+          <p:cNvSpPr>
+            <a:spLocks noGrp="1"/>
+          </p:cNvSpPr>
+          <p:nvPr>
+            <p:ph type="sldNum" sz="quarter" idx="12"/>
+          </p:nvPr>
+        </p:nvSpPr>
+        <p:spPr/>
+        <p:txBody>
+          <a:bodyPr/>
+          <a:lstStyle/>
+          <a:p>
+            <a:fld id="{281539D4-88A6-9745-9469-4F5F2210A50A}" type="slidenum">
+              <a:rPr lang="en-US" smtClean="0"/>
+              <a:t>15</a:t>
+            </a:fld>
+            <a:endParaRPr lang="en-US"/>
+          </a:p>
+        </p:txBody>
+      </p:sp>
+      <p:pic>
+        <p:nvPicPr>
+          <p:cNvPr id="7" name="Picture 6">
+            <a:extLst>
+              <a:ext uri="{FF2B5EF4-FFF2-40B4-BE49-F238E27FC236}">
+                <a16:creationId xmlns:a16="http://schemas.microsoft.com/office/drawing/2014/main" id="{C7B5FAAE-B314-3853-4524-D9B65037AF53}"/>
+              </a:ext>
+            </a:extLst>
+          </p:cNvPr>
+          <p:cNvPicPr>
+            <a:picLocks noChangeAspect="1"/>
+          </p:cNvPicPr>
+          <p:nvPr/>
+        </p:nvPicPr>
+        <p:blipFill>
+          <a:blip r:embed="rId4"/>
+          <a:stretch>
+            <a:fillRect/>
+          </a:stretch>
+        </p:blipFill>
+        <p:spPr>
+          <a:xfrm>
+            <a:off x="198560" y="678632"/>
+            <a:ext cx="5588049" cy="5500736"/>
+          </a:xfrm>
+          <a:prstGeom prst="rect">
+            <a:avLst/>
+          </a:prstGeom>
+        </p:spPr>
+      </p:pic>
+      <p:pic>
+        <p:nvPicPr>
+          <p:cNvPr id="8" name="Picture 7">
+            <a:extLst>
+              <a:ext uri="{FF2B5EF4-FFF2-40B4-BE49-F238E27FC236}">
+                <a16:creationId xmlns:a16="http://schemas.microsoft.com/office/drawing/2014/main" id="{74B070A6-E699-FDBA-08E6-887E34E5A3A8}"/>
+              </a:ext>
+            </a:extLst>
+          </p:cNvPr>
+          <p:cNvPicPr>
+            <a:picLocks noChangeAspect="1"/>
+          </p:cNvPicPr>
+          <p:nvPr/>
+        </p:nvPicPr>
+        <p:blipFill>
+          <a:blip r:embed="rId5"/>
+          <a:stretch>
+            <a:fillRect/>
+          </a:stretch>
+        </p:blipFill>
+        <p:spPr>
+          <a:xfrm>
+            <a:off x="6782087" y="637771"/>
+            <a:ext cx="5336624" cy="5582457"/>
+          </a:xfrm>
+          <a:prstGeom prst="rect">
+            <a:avLst/>
+          </a:prstGeom>
+        </p:spPr>
+      </p:pic>
+    </p:spTree>
+    <p:extLst>
+      <p:ext uri="{BB962C8B-B14F-4D97-AF65-F5344CB8AC3E}">
+        <p14:creationId xmlns:p14="http://schemas.microsoft.com/office/powerpoint/2010/main" val="1363935922"/>
+      </p:ext>
+    </p:extLst>
+  </p:cSld>
+  <p:clrMapOvr>
+    <a:masterClrMapping/>
+  </p:clrMapOvr>
+</p:sld>
+</file>
+
+<file path=ppt/slides/slide16.xml><?xml version="1.0" encoding="utf-8"?>
+<p:sld xmlns:a="http://schemas.openxmlformats.org/drawingml/2006/main" xmlns:r="http://schemas.openxmlformats.org/officeDocument/2006/relationships" xmlns:p="http://schemas.openxmlformats.org/presentationml/2006/main">
+  <p:cSld>
+    <p:spTree>
+      <p:nvGrpSpPr>
+        <p:cNvPr id="1" name=""/>
+        <p:cNvGrpSpPr/>
+        <p:nvPr/>
+      </p:nvGrpSpPr>
+      <p:grpSpPr>
+        <a:xfrm>
+          <a:off x="0" y="0"/>
+          <a:ext cx="0" cy="0"/>
+          <a:chOff x="0" y="0"/>
+          <a:chExt cx="0" cy="0"/>
+        </a:xfrm>
+      </p:grpSpPr>
+      <p:sp>
+        <p:nvSpPr>
+          <p:cNvPr id="2" name="Title 1">
+            <a:extLst>
+              <a:ext uri="{FF2B5EF4-FFF2-40B4-BE49-F238E27FC236}">
                 <a16:creationId xmlns:a16="http://schemas.microsoft.com/office/drawing/2014/main" id="{22D4EC78-8D20-9B69-EF42-948E5EF88EB1}"/>
               </a:ext>
             </a:extLst>
@@ -4997,7 +5319,7 @@
           <a:p>
             <a:fld id="{281539D4-88A6-9745-9469-4F5F2210A50A}" type="slidenum">
               <a:rPr lang="en-US" smtClean="0"/>
-              <a:t>15</a:t>
+              <a:t>16</a:t>
             </a:fld>
             <a:endParaRPr lang="en-US"/>
           </a:p>
@@ -5046,7 +5368,7 @@
 </p:sld>
 </file>
 
-<file path=ppt/slides/slide16.xml><?xml version="1.0" encoding="utf-8"?>
+<file path=ppt/slides/slide17.xml><?xml version="1.0" encoding="utf-8"?>
 <p:sld xmlns:a="http://schemas.openxmlformats.org/drawingml/2006/main" xmlns:r="http://schemas.openxmlformats.org/officeDocument/2006/relationships" xmlns:p="http://schemas.openxmlformats.org/presentationml/2006/main">
   <p:cSld>
     <p:spTree>
@@ -5136,7 +5458,7 @@
           <a:p>
             <a:fld id="{281539D4-88A6-9745-9469-4F5F2210A50A}" type="slidenum">
               <a:rPr lang="en-US" smtClean="0"/>
-              <a:t>16</a:t>
+              <a:t>17</a:t>
             </a:fld>
             <a:endParaRPr lang="en-US"/>
           </a:p>
@@ -5215,7 +5537,7 @@
 </p:sld>
 </file>
 
-<file path=ppt/slides/slide17.xml><?xml version="1.0" encoding="utf-8"?>
+<file path=ppt/slides/slide18.xml><?xml version="1.0" encoding="utf-8"?>
 <p:sld xmlns:a="http://schemas.openxmlformats.org/drawingml/2006/main" xmlns:r="http://schemas.openxmlformats.org/officeDocument/2006/relationships" xmlns:p="http://schemas.openxmlformats.org/presentationml/2006/main">
   <p:cSld>
     <p:spTree>
@@ -5315,7 +5637,7 @@
           <a:p>
             <a:fld id="{281539D4-88A6-9745-9469-4F5F2210A50A}" type="slidenum">
               <a:rPr lang="en-US" smtClean="0"/>
-              <a:t>17</a:t>
+              <a:t>18</a:t>
             </a:fld>
             <a:endParaRPr lang="en-US"/>
           </a:p>
@@ -5394,7 +5716,7 @@
 </p:sld>
 </file>
 
-<file path=ppt/slides/slide18.xml><?xml version="1.0" encoding="utf-8"?>
+<file path=ppt/slides/slide19.xml><?xml version="1.0" encoding="utf-8"?>
 <p:sld xmlns:a="http://schemas.openxmlformats.org/drawingml/2006/main" xmlns:r="http://schemas.openxmlformats.org/officeDocument/2006/relationships" xmlns:p="http://schemas.openxmlformats.org/presentationml/2006/main">
   <p:cSld>
     <p:spTree>
@@ -5484,7 +5806,7 @@
           <a:p>
             <a:fld id="{281539D4-88A6-9745-9469-4F5F2210A50A}" type="slidenum">
               <a:rPr lang="en-US" smtClean="0"/>
-              <a:t>18</a:t>
+              <a:t>19</a:t>
             </a:fld>
             <a:endParaRPr lang="en-US"/>
           </a:p>
@@ -5697,7 +6019,7 @@
 </p:sld>
 </file>
 
-<file path=ppt/slides/slide19.xml><?xml version="1.0" encoding="utf-8"?>
+<file path=ppt/slides/slide2.xml><?xml version="1.0" encoding="utf-8"?>
 <p:sld xmlns:a="http://schemas.openxmlformats.org/drawingml/2006/main" xmlns:r="http://schemas.openxmlformats.org/officeDocument/2006/relationships" xmlns:p="http://schemas.openxmlformats.org/presentationml/2006/main">
   <p:cSld>
     <p:spTree>
@@ -5719,6 +6041,196 @@
           <p:cNvPr id="2" name="Title 1">
             <a:extLst>
               <a:ext uri="{FF2B5EF4-FFF2-40B4-BE49-F238E27FC236}">
+                <a16:creationId xmlns:a16="http://schemas.microsoft.com/office/drawing/2014/main" id="{BB75C3B5-F809-2789-F91C-2A65012DD181}"/>
+              </a:ext>
+            </a:extLst>
+          </p:cNvPr>
+          <p:cNvSpPr>
+            <a:spLocks noGrp="1"/>
+          </p:cNvSpPr>
+          <p:nvPr>
+            <p:ph type="title"/>
+          </p:nvPr>
+        </p:nvSpPr>
+        <p:spPr>
+          <a:xfrm>
+            <a:off x="838200" y="365125"/>
+            <a:ext cx="10515600" cy="808767"/>
+          </a:xfrm>
+        </p:spPr>
+        <p:txBody>
+          <a:bodyPr/>
+          <a:lstStyle/>
+          <a:p>
+            <a:r>
+              <a:rPr lang="en-US" dirty="0"/>
+              <a:t>Agenda </a:t>
+            </a:r>
+          </a:p>
+        </p:txBody>
+      </p:sp>
+      <p:sp>
+        <p:nvSpPr>
+          <p:cNvPr id="3" name="Content Placeholder 2">
+            <a:extLst>
+              <a:ext uri="{FF2B5EF4-FFF2-40B4-BE49-F238E27FC236}">
+                <a16:creationId xmlns:a16="http://schemas.microsoft.com/office/drawing/2014/main" id="{8EDBB54C-257C-03AF-17C3-6D0D1A537C96}"/>
+              </a:ext>
+            </a:extLst>
+          </p:cNvPr>
+          <p:cNvSpPr>
+            <a:spLocks noGrp="1"/>
+          </p:cNvSpPr>
+          <p:nvPr>
+            <p:ph idx="1"/>
+          </p:nvPr>
+        </p:nvSpPr>
+        <p:spPr>
+          <a:xfrm>
+            <a:off x="838200" y="1345324"/>
+            <a:ext cx="10515600" cy="4831639"/>
+          </a:xfrm>
+        </p:spPr>
+        <p:txBody>
+          <a:bodyPr>
+            <a:normAutofit/>
+          </a:bodyPr>
+          <a:lstStyle/>
+          <a:p>
+            <a:r>
+              <a:rPr lang="en-US" dirty="0"/>
+              <a:t>Introduction</a:t>
+            </a:r>
+          </a:p>
+          <a:p>
+            <a:pPr lvl="1"/>
+            <a:r>
+              <a:rPr lang="en-US" dirty="0"/>
+              <a:t>Summary of the Research </a:t>
+            </a:r>
+          </a:p>
+          <a:p>
+            <a:pPr lvl="1"/>
+            <a:r>
+              <a:rPr lang="en-US" dirty="0"/>
+              <a:t>Key Findings and Contributions</a:t>
+            </a:r>
+          </a:p>
+          <a:p>
+            <a:r>
+              <a:rPr lang="en-US" dirty="0"/>
+              <a:t>Methodology </a:t>
+            </a:r>
+          </a:p>
+          <a:p>
+            <a:pPr lvl="1"/>
+            <a:r>
+              <a:rPr lang="en-US" dirty="0"/>
+              <a:t>Formulation</a:t>
+            </a:r>
+          </a:p>
+          <a:p>
+            <a:pPr lvl="1"/>
+            <a:r>
+              <a:rPr lang="en-US" dirty="0"/>
+              <a:t>Explainable Boosting Machines</a:t>
+            </a:r>
+          </a:p>
+          <a:p>
+            <a:pPr lvl="1"/>
+            <a:r>
+              <a:rPr lang="en-US" dirty="0"/>
+              <a:t>Evaluation</a:t>
+            </a:r>
+          </a:p>
+          <a:p>
+            <a:pPr lvl="1"/>
+            <a:r>
+              <a:rPr lang="en-US" dirty="0"/>
+              <a:t>Importances </a:t>
+            </a:r>
+          </a:p>
+          <a:p>
+            <a:r>
+              <a:rPr lang="en-US" dirty="0"/>
+              <a:t>Data</a:t>
+            </a:r>
+          </a:p>
+          <a:p>
+            <a:r>
+              <a:rPr lang="en-US" dirty="0"/>
+              <a:t>Empirical Results </a:t>
+            </a:r>
+          </a:p>
+          <a:p>
+            <a:endParaRPr lang="en-US" dirty="0"/>
+          </a:p>
+        </p:txBody>
+      </p:sp>
+      <p:sp>
+        <p:nvSpPr>
+          <p:cNvPr id="4" name="Slide Number Placeholder 3">
+            <a:extLst>
+              <a:ext uri="{FF2B5EF4-FFF2-40B4-BE49-F238E27FC236}">
+                <a16:creationId xmlns:a16="http://schemas.microsoft.com/office/drawing/2014/main" id="{C30A70E3-64D2-EB67-0B81-530353235B91}"/>
+              </a:ext>
+            </a:extLst>
+          </p:cNvPr>
+          <p:cNvSpPr>
+            <a:spLocks noGrp="1"/>
+          </p:cNvSpPr>
+          <p:nvPr>
+            <p:ph type="sldNum" sz="quarter" idx="12"/>
+          </p:nvPr>
+        </p:nvSpPr>
+        <p:spPr/>
+        <p:txBody>
+          <a:bodyPr/>
+          <a:lstStyle/>
+          <a:p>
+            <a:fld id="{281539D4-88A6-9745-9469-4F5F2210A50A}" type="slidenum">
+              <a:rPr lang="en-US" smtClean="0"/>
+              <a:t>2</a:t>
+            </a:fld>
+            <a:endParaRPr lang="en-US"/>
+          </a:p>
+        </p:txBody>
+      </p:sp>
+    </p:spTree>
+    <p:extLst>
+      <p:ext uri="{BB962C8B-B14F-4D97-AF65-F5344CB8AC3E}">
+        <p14:creationId xmlns:p14="http://schemas.microsoft.com/office/powerpoint/2010/main" val="1666810006"/>
+      </p:ext>
+    </p:extLst>
+  </p:cSld>
+  <p:clrMapOvr>
+    <a:masterClrMapping/>
+  </p:clrMapOvr>
+</p:sld>
+</file>
+
+<file path=ppt/slides/slide20.xml><?xml version="1.0" encoding="utf-8"?>
+<p:sld xmlns:a="http://schemas.openxmlformats.org/drawingml/2006/main" xmlns:r="http://schemas.openxmlformats.org/officeDocument/2006/relationships" xmlns:p="http://schemas.openxmlformats.org/presentationml/2006/main">
+  <p:cSld>
+    <p:spTree>
+      <p:nvGrpSpPr>
+        <p:cNvPr id="1" name=""/>
+        <p:cNvGrpSpPr/>
+        <p:nvPr/>
+      </p:nvGrpSpPr>
+      <p:grpSpPr>
+        <a:xfrm>
+          <a:off x="0" y="0"/>
+          <a:ext cx="0" cy="0"/>
+          <a:chOff x="0" y="0"/>
+          <a:chExt cx="0" cy="0"/>
+        </a:xfrm>
+      </p:grpSpPr>
+      <p:sp>
+        <p:nvSpPr>
+          <p:cNvPr id="2" name="Title 1">
+            <a:extLst>
+              <a:ext uri="{FF2B5EF4-FFF2-40B4-BE49-F238E27FC236}">
                 <a16:creationId xmlns:a16="http://schemas.microsoft.com/office/drawing/2014/main" id="{BE480643-C2F6-517D-25F9-0F41C131201D}"/>
               </a:ext>
             </a:extLst>
@@ -5795,7 +6307,7 @@
           <a:p>
             <a:fld id="{281539D4-88A6-9745-9469-4F5F2210A50A}" type="slidenum">
               <a:rPr lang="en-US" smtClean="0"/>
-              <a:t>19</a:t>
+              <a:t>20</a:t>
             </a:fld>
             <a:endParaRPr lang="en-US"/>
           </a:p>
@@ -5874,7 +6386,7 @@
 </p:sld>
 </file>
 
-<file path=ppt/slides/slide2.xml><?xml version="1.0" encoding="utf-8"?>
+<file path=ppt/slides/slide21.xml><?xml version="1.0" encoding="utf-8"?>
 <p:sld xmlns:a="http://schemas.openxmlformats.org/drawingml/2006/main" xmlns:r="http://schemas.openxmlformats.org/officeDocument/2006/relationships" xmlns:p="http://schemas.openxmlformats.org/presentationml/2006/main">
   <p:cSld>
     <p:spTree>
@@ -5896,196 +6408,6 @@
           <p:cNvPr id="2" name="Title 1">
             <a:extLst>
               <a:ext uri="{FF2B5EF4-FFF2-40B4-BE49-F238E27FC236}">
-                <a16:creationId xmlns:a16="http://schemas.microsoft.com/office/drawing/2014/main" id="{BB75C3B5-F809-2789-F91C-2A65012DD181}"/>
-              </a:ext>
-            </a:extLst>
-          </p:cNvPr>
-          <p:cNvSpPr>
-            <a:spLocks noGrp="1"/>
-          </p:cNvSpPr>
-          <p:nvPr>
-            <p:ph type="title"/>
-          </p:nvPr>
-        </p:nvSpPr>
-        <p:spPr>
-          <a:xfrm>
-            <a:off x="838200" y="365125"/>
-            <a:ext cx="10515600" cy="808767"/>
-          </a:xfrm>
-        </p:spPr>
-        <p:txBody>
-          <a:bodyPr/>
-          <a:lstStyle/>
-          <a:p>
-            <a:r>
-              <a:rPr lang="en-US" dirty="0"/>
-              <a:t>Agenda </a:t>
-            </a:r>
-          </a:p>
-        </p:txBody>
-      </p:sp>
-      <p:sp>
-        <p:nvSpPr>
-          <p:cNvPr id="3" name="Content Placeholder 2">
-            <a:extLst>
-              <a:ext uri="{FF2B5EF4-FFF2-40B4-BE49-F238E27FC236}">
-                <a16:creationId xmlns:a16="http://schemas.microsoft.com/office/drawing/2014/main" id="{8EDBB54C-257C-03AF-17C3-6D0D1A537C96}"/>
-              </a:ext>
-            </a:extLst>
-          </p:cNvPr>
-          <p:cNvSpPr>
-            <a:spLocks noGrp="1"/>
-          </p:cNvSpPr>
-          <p:nvPr>
-            <p:ph idx="1"/>
-          </p:nvPr>
-        </p:nvSpPr>
-        <p:spPr>
-          <a:xfrm>
-            <a:off x="838200" y="1345324"/>
-            <a:ext cx="10515600" cy="4831639"/>
-          </a:xfrm>
-        </p:spPr>
-        <p:txBody>
-          <a:bodyPr>
-            <a:normAutofit/>
-          </a:bodyPr>
-          <a:lstStyle/>
-          <a:p>
-            <a:r>
-              <a:rPr lang="en-US" dirty="0"/>
-              <a:t>Introduction</a:t>
-            </a:r>
-          </a:p>
-          <a:p>
-            <a:pPr lvl="1"/>
-            <a:r>
-              <a:rPr lang="en-US" dirty="0"/>
-              <a:t>Summary of the Research </a:t>
-            </a:r>
-          </a:p>
-          <a:p>
-            <a:pPr lvl="1"/>
-            <a:r>
-              <a:rPr lang="en-US" dirty="0"/>
-              <a:t>Key Findings and Contributions</a:t>
-            </a:r>
-          </a:p>
-          <a:p>
-            <a:r>
-              <a:rPr lang="en-US" dirty="0"/>
-              <a:t>Methodology </a:t>
-            </a:r>
-          </a:p>
-          <a:p>
-            <a:pPr lvl="1"/>
-            <a:r>
-              <a:rPr lang="en-US" dirty="0"/>
-              <a:t>Formulation</a:t>
-            </a:r>
-          </a:p>
-          <a:p>
-            <a:pPr lvl="1"/>
-            <a:r>
-              <a:rPr lang="en-US" dirty="0"/>
-              <a:t>Explainable Boosting Machines</a:t>
-            </a:r>
-          </a:p>
-          <a:p>
-            <a:pPr lvl="1"/>
-            <a:r>
-              <a:rPr lang="en-US" dirty="0"/>
-              <a:t>Evaluation</a:t>
-            </a:r>
-          </a:p>
-          <a:p>
-            <a:pPr lvl="1"/>
-            <a:r>
-              <a:rPr lang="en-US" dirty="0"/>
-              <a:t>Importances </a:t>
-            </a:r>
-          </a:p>
-          <a:p>
-            <a:r>
-              <a:rPr lang="en-US" dirty="0"/>
-              <a:t>Data</a:t>
-            </a:r>
-          </a:p>
-          <a:p>
-            <a:r>
-              <a:rPr lang="en-US" dirty="0"/>
-              <a:t>Empirical Results </a:t>
-            </a:r>
-          </a:p>
-          <a:p>
-            <a:endParaRPr lang="en-US" dirty="0"/>
-          </a:p>
-        </p:txBody>
-      </p:sp>
-      <p:sp>
-        <p:nvSpPr>
-          <p:cNvPr id="4" name="Slide Number Placeholder 3">
-            <a:extLst>
-              <a:ext uri="{FF2B5EF4-FFF2-40B4-BE49-F238E27FC236}">
-                <a16:creationId xmlns:a16="http://schemas.microsoft.com/office/drawing/2014/main" id="{C30A70E3-64D2-EB67-0B81-530353235B91}"/>
-              </a:ext>
-            </a:extLst>
-          </p:cNvPr>
-          <p:cNvSpPr>
-            <a:spLocks noGrp="1"/>
-          </p:cNvSpPr>
-          <p:nvPr>
-            <p:ph type="sldNum" sz="quarter" idx="12"/>
-          </p:nvPr>
-        </p:nvSpPr>
-        <p:spPr/>
-        <p:txBody>
-          <a:bodyPr/>
-          <a:lstStyle/>
-          <a:p>
-            <a:fld id="{281539D4-88A6-9745-9469-4F5F2210A50A}" type="slidenum">
-              <a:rPr lang="en-US" smtClean="0"/>
-              <a:t>2</a:t>
-            </a:fld>
-            <a:endParaRPr lang="en-US"/>
-          </a:p>
-        </p:txBody>
-      </p:sp>
-    </p:spTree>
-    <p:extLst>
-      <p:ext uri="{BB962C8B-B14F-4D97-AF65-F5344CB8AC3E}">
-        <p14:creationId xmlns:p14="http://schemas.microsoft.com/office/powerpoint/2010/main" val="1666810006"/>
-      </p:ext>
-    </p:extLst>
-  </p:cSld>
-  <p:clrMapOvr>
-    <a:masterClrMapping/>
-  </p:clrMapOvr>
-</p:sld>
-</file>
-
-<file path=ppt/slides/slide20.xml><?xml version="1.0" encoding="utf-8"?>
-<p:sld xmlns:a="http://schemas.openxmlformats.org/drawingml/2006/main" xmlns:r="http://schemas.openxmlformats.org/officeDocument/2006/relationships" xmlns:p="http://schemas.openxmlformats.org/presentationml/2006/main">
-  <p:cSld>
-    <p:spTree>
-      <p:nvGrpSpPr>
-        <p:cNvPr id="1" name=""/>
-        <p:cNvGrpSpPr/>
-        <p:nvPr/>
-      </p:nvGrpSpPr>
-      <p:grpSpPr>
-        <a:xfrm>
-          <a:off x="0" y="0"/>
-          <a:ext cx="0" cy="0"/>
-          <a:chOff x="0" y="0"/>
-          <a:chExt cx="0" cy="0"/>
-        </a:xfrm>
-      </p:grpSpPr>
-      <p:sp>
-        <p:nvSpPr>
-          <p:cNvPr id="2" name="Title 1">
-            <a:extLst>
-              <a:ext uri="{FF2B5EF4-FFF2-40B4-BE49-F238E27FC236}">
                 <a16:creationId xmlns:a16="http://schemas.microsoft.com/office/drawing/2014/main" id="{936C3C9E-C91C-2388-4E04-9E228696204F}"/>
               </a:ext>
             </a:extLst>
@@ -6162,7 +6484,7 @@
           <a:p>
             <a:fld id="{281539D4-88A6-9745-9469-4F5F2210A50A}" type="slidenum">
               <a:rPr lang="en-US" smtClean="0"/>
-              <a:t>20</a:t>
+              <a:t>21</a:t>
             </a:fld>
             <a:endParaRPr lang="en-US"/>
           </a:p>
@@ -6241,7 +6563,7 @@
 </p:sld>
 </file>
 
-<file path=ppt/slides/slide21.xml><?xml version="1.0" encoding="utf-8"?>
+<file path=ppt/slides/slide22.xml><?xml version="1.0" encoding="utf-8"?>
 <p:sld xmlns:a="http://schemas.openxmlformats.org/drawingml/2006/main" xmlns:r="http://schemas.openxmlformats.org/officeDocument/2006/relationships" xmlns:p="http://schemas.openxmlformats.org/presentationml/2006/main">
   <p:cSld>
     <p:spTree>
@@ -6341,7 +6663,7 @@
           <a:p>
             <a:fld id="{281539D4-88A6-9745-9469-4F5F2210A50A}" type="slidenum">
               <a:rPr lang="en-US" smtClean="0"/>
-              <a:t>21</a:t>
+              <a:t>22</a:t>
             </a:fld>
             <a:endParaRPr lang="en-US"/>
           </a:p>
@@ -6420,7 +6742,7 @@
 </p:sld>
 </file>
 
-<file path=ppt/slides/slide22.xml><?xml version="1.0" encoding="utf-8"?>
+<file path=ppt/slides/slide23.xml><?xml version="1.0" encoding="utf-8"?>
 <p:sld xmlns:a="http://schemas.openxmlformats.org/drawingml/2006/main" xmlns:r="http://schemas.openxmlformats.org/officeDocument/2006/relationships" xmlns:p="http://schemas.openxmlformats.org/presentationml/2006/main">
   <p:cSld>
     <p:spTree>
@@ -6520,7 +6842,7 @@
           <a:p>
             <a:fld id="{281539D4-88A6-9745-9469-4F5F2210A50A}" type="slidenum">
               <a:rPr lang="en-US" smtClean="0"/>
-              <a:t>22</a:t>
+              <a:t>23</a:t>
             </a:fld>
             <a:endParaRPr lang="en-US"/>
           </a:p>
@@ -6599,7 +6921,7 @@
 </p:sld>
 </file>
 
-<file path=ppt/slides/slide23.xml><?xml version="1.0" encoding="utf-8"?>
+<file path=ppt/slides/slide24.xml><?xml version="1.0" encoding="utf-8"?>
 <p:sld xmlns:a="http://schemas.openxmlformats.org/drawingml/2006/main" xmlns:r="http://schemas.openxmlformats.org/officeDocument/2006/relationships" xmlns:p="http://schemas.openxmlformats.org/presentationml/2006/main">
   <p:cSld>
     <p:spTree>
@@ -6699,7 +7021,7 @@
           <a:p>
             <a:fld id="{281539D4-88A6-9745-9469-4F5F2210A50A}" type="slidenum">
               <a:rPr lang="en-US" smtClean="0"/>
-              <a:t>23</a:t>
+              <a:t>24</a:t>
             </a:fld>
             <a:endParaRPr lang="en-US"/>
           </a:p>
@@ -6778,7 +7100,7 @@
 </p:sld>
 </file>
 
-<file path=ppt/slides/slide24.xml><?xml version="1.0" encoding="utf-8"?>
+<file path=ppt/slides/slide25.xml><?xml version="1.0" encoding="utf-8"?>
 <p:sld xmlns:a="http://schemas.openxmlformats.org/drawingml/2006/main" xmlns:r="http://schemas.openxmlformats.org/officeDocument/2006/relationships" xmlns:p="http://schemas.openxmlformats.org/presentationml/2006/main">
   <p:cSld>
     <p:spTree>
@@ -6876,7 +7198,7 @@
           <a:p>
             <a:fld id="{281539D4-88A6-9745-9469-4F5F2210A50A}" type="slidenum">
               <a:rPr lang="en-US" smtClean="0"/>
-              <a:t>24</a:t>
+              <a:t>25</a:t>
             </a:fld>
             <a:endParaRPr lang="en-US"/>
           </a:p>
@@ -6955,7 +7277,7 @@
 </p:sld>
 </file>
 
-<file path=ppt/slides/slide25.xml><?xml version="1.0" encoding="utf-8"?>
+<file path=ppt/slides/slide26.xml><?xml version="1.0" encoding="utf-8"?>
 <p:sld xmlns:a="http://schemas.openxmlformats.org/drawingml/2006/main" xmlns:r="http://schemas.openxmlformats.org/officeDocument/2006/relationships" xmlns:p="http://schemas.openxmlformats.org/presentationml/2006/main">
   <p:cSld>
     <p:spTree>
@@ -7045,7 +7367,7 @@
           <a:p>
             <a:fld id="{281539D4-88A6-9745-9469-4F5F2210A50A}" type="slidenum">
               <a:rPr lang="en-US" smtClean="0"/>
-              <a:t>25</a:t>
+              <a:t>26</a:t>
             </a:fld>
             <a:endParaRPr lang="en-US"/>
           </a:p>
@@ -7094,7 +7416,7 @@
 </p:sld>
 </file>
 
-<file path=ppt/slides/slide26.xml><?xml version="1.0" encoding="utf-8"?>
+<file path=ppt/slides/slide27.xml><?xml version="1.0" encoding="utf-8"?>
 <p:sld xmlns:a="http://schemas.openxmlformats.org/drawingml/2006/main" xmlns:r="http://schemas.openxmlformats.org/officeDocument/2006/relationships" xmlns:p="http://schemas.openxmlformats.org/presentationml/2006/main">
   <p:cSld>
     <p:spTree>
@@ -7226,7 +7548,7 @@
           <a:p>
             <a:fld id="{281539D4-88A6-9745-9469-4F5F2210A50A}" type="slidenum">
               <a:rPr lang="en-US" smtClean="0"/>
-              <a:t>26</a:t>
+              <a:t>27</a:t>
             </a:fld>
             <a:endParaRPr lang="en-US"/>
           </a:p>

</xml_diff>